<commit_message>
point release to fix nuget package
</commit_message>
<xml_diff>
--- a/Domain Driven Events.pptx
+++ b/Domain Driven Events.pptx
@@ -5,7 +5,7 @@
     <p:sldMasterId id="2147483648" r:id="rId1"/>
   </p:sldMasterIdLst>
   <p:notesMasterIdLst>
-    <p:notesMasterId r:id="rId10"/>
+    <p:notesMasterId r:id="rId11"/>
   </p:notesMasterIdLst>
   <p:sldIdLst>
     <p:sldId id="256" r:id="rId2"/>
@@ -16,6 +16,7 @@
     <p:sldId id="261" r:id="rId7"/>
     <p:sldId id="262" r:id="rId8"/>
     <p:sldId id="263" r:id="rId9"/>
+    <p:sldId id="264" r:id="rId10"/>
   </p:sldIdLst>
   <p:sldSz cx="9144000" cy="6858000" type="screen4x3"/>
   <p:notesSz cx="6858000" cy="9144000"/>
@@ -199,7 +200,7 @@
           <a:p>
             <a:fld id="{4F85EB67-85EB-450D-9B0A-DCA86C0FF734}" type="datetimeFigureOut">
               <a:rPr lang="en-US" smtClean="0"/>
-              <a:t>8/16/2012</a:t>
+              <a:t>8/23/2012</a:t>
             </a:fld>
             <a:endParaRPr lang="en-US"/>
           </a:p>
@@ -1050,7 +1051,7 @@
           <a:p>
             <a:fld id="{B41FAA99-93DC-4784-96B3-F0632BEDB3F4}" type="datetimeFigureOut">
               <a:rPr lang="en-US" smtClean="0"/>
-              <a:t>8/16/2012</a:t>
+              <a:t>8/23/2012</a:t>
             </a:fld>
             <a:endParaRPr lang="en-US"/>
           </a:p>
@@ -1220,7 +1221,7 @@
           <a:p>
             <a:fld id="{B41FAA99-93DC-4784-96B3-F0632BEDB3F4}" type="datetimeFigureOut">
               <a:rPr lang="en-US" smtClean="0"/>
-              <a:t>8/16/2012</a:t>
+              <a:t>8/23/2012</a:t>
             </a:fld>
             <a:endParaRPr lang="en-US"/>
           </a:p>
@@ -1400,7 +1401,7 @@
           <a:p>
             <a:fld id="{B41FAA99-93DC-4784-96B3-F0632BEDB3F4}" type="datetimeFigureOut">
               <a:rPr lang="en-US" smtClean="0"/>
-              <a:t>8/16/2012</a:t>
+              <a:t>8/23/2012</a:t>
             </a:fld>
             <a:endParaRPr lang="en-US"/>
           </a:p>
@@ -1570,7 +1571,7 @@
           <a:p>
             <a:fld id="{B41FAA99-93DC-4784-96B3-F0632BEDB3F4}" type="datetimeFigureOut">
               <a:rPr lang="en-US" smtClean="0"/>
-              <a:t>8/16/2012</a:t>
+              <a:t>8/23/2012</a:t>
             </a:fld>
             <a:endParaRPr lang="en-US"/>
           </a:p>
@@ -1816,7 +1817,7 @@
           <a:p>
             <a:fld id="{B41FAA99-93DC-4784-96B3-F0632BEDB3F4}" type="datetimeFigureOut">
               <a:rPr lang="en-US" smtClean="0"/>
-              <a:t>8/16/2012</a:t>
+              <a:t>8/23/2012</a:t>
             </a:fld>
             <a:endParaRPr lang="en-US"/>
           </a:p>
@@ -2104,7 +2105,7 @@
           <a:p>
             <a:fld id="{B41FAA99-93DC-4784-96B3-F0632BEDB3F4}" type="datetimeFigureOut">
               <a:rPr lang="en-US" smtClean="0"/>
-              <a:t>8/16/2012</a:t>
+              <a:t>8/23/2012</a:t>
             </a:fld>
             <a:endParaRPr lang="en-US"/>
           </a:p>
@@ -2526,7 +2527,7 @@
           <a:p>
             <a:fld id="{B41FAA99-93DC-4784-96B3-F0632BEDB3F4}" type="datetimeFigureOut">
               <a:rPr lang="en-US" smtClean="0"/>
-              <a:t>8/16/2012</a:t>
+              <a:t>8/23/2012</a:t>
             </a:fld>
             <a:endParaRPr lang="en-US"/>
           </a:p>
@@ -2644,7 +2645,7 @@
           <a:p>
             <a:fld id="{B41FAA99-93DC-4784-96B3-F0632BEDB3F4}" type="datetimeFigureOut">
               <a:rPr lang="en-US" smtClean="0"/>
-              <a:t>8/16/2012</a:t>
+              <a:t>8/23/2012</a:t>
             </a:fld>
             <a:endParaRPr lang="en-US"/>
           </a:p>
@@ -2739,7 +2740,7 @@
           <a:p>
             <a:fld id="{B41FAA99-93DC-4784-96B3-F0632BEDB3F4}" type="datetimeFigureOut">
               <a:rPr lang="en-US" smtClean="0"/>
-              <a:t>8/16/2012</a:t>
+              <a:t>8/23/2012</a:t>
             </a:fld>
             <a:endParaRPr lang="en-US"/>
           </a:p>
@@ -3016,7 +3017,7 @@
           <a:p>
             <a:fld id="{B41FAA99-93DC-4784-96B3-F0632BEDB3F4}" type="datetimeFigureOut">
               <a:rPr lang="en-US" smtClean="0"/>
-              <a:t>8/16/2012</a:t>
+              <a:t>8/23/2012</a:t>
             </a:fld>
             <a:endParaRPr lang="en-US"/>
           </a:p>
@@ -3269,7 +3270,7 @@
           <a:p>
             <a:fld id="{B41FAA99-93DC-4784-96B3-F0632BEDB3F4}" type="datetimeFigureOut">
               <a:rPr lang="en-US" smtClean="0"/>
-              <a:t>8/16/2012</a:t>
+              <a:t>8/23/2012</a:t>
             </a:fld>
             <a:endParaRPr lang="en-US"/>
           </a:p>
@@ -3482,7 +3483,7 @@
           <a:p>
             <a:fld id="{B41FAA99-93DC-4784-96B3-F0632BEDB3F4}" type="datetimeFigureOut">
               <a:rPr lang="en-US" smtClean="0"/>
-              <a:t>8/16/2012</a:t>
+              <a:t>8/23/2012</a:t>
             </a:fld>
             <a:endParaRPr lang="en-US"/>
           </a:p>
@@ -5035,11 +5036,7 @@
           <a:p>
             <a:r>
               <a:rPr lang="en-US" dirty="0" smtClean="0"/>
-              <a:t>What are Domain </a:t>
-            </a:r>
-            <a:r>
-              <a:rPr lang="en-US" dirty="0" smtClean="0"/>
-              <a:t>Events</a:t>
+              <a:t>What are Domain Events</a:t>
             </a:r>
             <a:endParaRPr lang="en-US" dirty="0"/>
           </a:p>
@@ -5384,6 +5381,195 @@
       </p:par>
     </p:tnLst>
   </p:timing>
+</p:sld>
+</file>
+
+<file path=ppt/slides/slide9.xml><?xml version="1.0" encoding="utf-8"?>
+<p:sld xmlns:a="http://schemas.openxmlformats.org/drawingml/2006/main" xmlns:r="http://schemas.openxmlformats.org/officeDocument/2006/relationships" xmlns:p="http://schemas.openxmlformats.org/presentationml/2006/main">
+  <p:cSld>
+    <p:spTree>
+      <p:nvGrpSpPr>
+        <p:cNvPr id="1" name=""/>
+        <p:cNvGrpSpPr/>
+        <p:nvPr/>
+      </p:nvGrpSpPr>
+      <p:grpSpPr>
+        <a:xfrm>
+          <a:off x="0" y="0"/>
+          <a:ext cx="0" cy="0"/>
+          <a:chOff x="0" y="0"/>
+          <a:chExt cx="0" cy="0"/>
+        </a:xfrm>
+      </p:grpSpPr>
+      <p:sp>
+        <p:nvSpPr>
+          <p:cNvPr id="2" name="Title 1"/>
+          <p:cNvSpPr>
+            <a:spLocks noGrp="1"/>
+          </p:cNvSpPr>
+          <p:nvPr>
+            <p:ph type="title"/>
+          </p:nvPr>
+        </p:nvSpPr>
+        <p:spPr/>
+        <p:txBody>
+          <a:bodyPr/>
+          <a:lstStyle/>
+          <a:p>
+            <a:r>
+              <a:rPr lang="en-US" dirty="0" smtClean="0"/>
+              <a:t>Resources</a:t>
+            </a:r>
+            <a:endParaRPr lang="en-US" dirty="0"/>
+          </a:p>
+        </p:txBody>
+      </p:sp>
+      <p:sp>
+        <p:nvSpPr>
+          <p:cNvPr id="3" name="Content Placeholder 2"/>
+          <p:cNvSpPr>
+            <a:spLocks noGrp="1"/>
+          </p:cNvSpPr>
+          <p:nvPr>
+            <p:ph idx="1"/>
+          </p:nvPr>
+        </p:nvSpPr>
+        <p:spPr/>
+        <p:txBody>
+          <a:bodyPr/>
+          <a:lstStyle/>
+          <a:p>
+            <a:r>
+              <a:rPr lang="en-US" dirty="0" smtClean="0"/>
+              <a:t>My Email – </a:t>
+            </a:r>
+            <a:r>
+              <a:rPr lang="en-US" dirty="0" smtClean="0">
+                <a:hlinkClick r:id="rId2"/>
+              </a:rPr>
+              <a:t>jay@jaysmith.us</a:t>
+            </a:r>
+            <a:endParaRPr lang="en-US" dirty="0" smtClean="0"/>
+          </a:p>
+          <a:p>
+            <a:r>
+              <a:rPr lang="en-US" dirty="0" smtClean="0"/>
+              <a:t>My Blog – </a:t>
+            </a:r>
+            <a:r>
+              <a:rPr lang="en-US" dirty="0" smtClean="0">
+                <a:hlinkClick r:id="rId3"/>
+              </a:rPr>
+              <a:t>http://jaysmith.us</a:t>
+            </a:r>
+            <a:endParaRPr lang="en-US" dirty="0" smtClean="0"/>
+          </a:p>
+          <a:p>
+            <a:r>
+              <a:rPr lang="en-US" dirty="0"/>
+              <a:t>Other Links - </a:t>
+            </a:r>
+            <a:r>
+              <a:rPr lang="en-US" dirty="0">
+                <a:hlinkClick r:id="rId4"/>
+              </a:rPr>
+              <a:t>http://</a:t>
+            </a:r>
+            <a:r>
+              <a:rPr lang="en-US" dirty="0" smtClean="0">
+                <a:hlinkClick r:id="rId4"/>
+              </a:rPr>
+              <a:t>delicious.com/jay.smith/domainevents</a:t>
+            </a:r>
+            <a:endParaRPr lang="en-US" dirty="0" smtClean="0"/>
+          </a:p>
+          <a:p>
+            <a:r>
+              <a:rPr lang="en-US" dirty="0" err="1" smtClean="0"/>
+              <a:t>Udi</a:t>
+            </a:r>
+            <a:r>
+              <a:rPr lang="en-US" dirty="0" smtClean="0"/>
+              <a:t> </a:t>
+            </a:r>
+            <a:r>
+              <a:rPr lang="en-US" dirty="0" err="1" smtClean="0"/>
+              <a:t>Dahan’s</a:t>
+            </a:r>
+            <a:r>
+              <a:rPr lang="en-US" dirty="0"/>
+              <a:t> Blog - </a:t>
+            </a:r>
+            <a:r>
+              <a:rPr lang="en-US" dirty="0">
+                <a:hlinkClick r:id="rId5"/>
+              </a:rPr>
+              <a:t>http://</a:t>
+            </a:r>
+            <a:r>
+              <a:rPr lang="en-US" dirty="0" smtClean="0">
+                <a:hlinkClick r:id="rId5"/>
+              </a:rPr>
+              <a:t>www.udidahan.com</a:t>
+            </a:r>
+            <a:endParaRPr lang="en-US" dirty="0" smtClean="0"/>
+          </a:p>
+          <a:p>
+            <a:endParaRPr lang="en-US" dirty="0"/>
+          </a:p>
+        </p:txBody>
+      </p:sp>
+      <p:pic>
+        <p:nvPicPr>
+          <p:cNvPr id="4" name="Picture 4" descr="https://encrypted-tbn1.google.com/images?q=tbn:ANd9GcRC1HaugnmxnH3j61JBG-qAVfZxBSDQm7vzjVv8LIiekWTqxKgs"/>
+          <p:cNvPicPr>
+            <a:picLocks noChangeAspect="1" noChangeArrowheads="1"/>
+          </p:cNvPicPr>
+          <p:nvPr/>
+        </p:nvPicPr>
+        <p:blipFill>
+          <a:blip r:embed="rId6">
+            <a:extLst>
+              <a:ext uri="{28A0092B-C50C-407E-A947-70E740481C1C}">
+                <a14:useLocalDpi xmlns:a14="http://schemas.microsoft.com/office/drawing/2010/main" val="0"/>
+              </a:ext>
+            </a:extLst>
+          </a:blip>
+          <a:srcRect/>
+          <a:stretch>
+            <a:fillRect/>
+          </a:stretch>
+        </p:blipFill>
+        <p:spPr bwMode="auto">
+          <a:xfrm flipH="1">
+            <a:off x="7467600" y="4457699"/>
+            <a:ext cx="1247775" cy="2171701"/>
+          </a:xfrm>
+          <a:prstGeom prst="rect">
+            <a:avLst/>
+          </a:prstGeom>
+          <a:noFill/>
+          <a:extLst>
+            <a:ext uri="{909E8E84-426E-40DD-AFC4-6F175D3DCCD1}">
+              <a14:hiddenFill xmlns:a14="http://schemas.microsoft.com/office/drawing/2010/main">
+                <a:solidFill>
+                  <a:srgbClr val="FFFFFF"/>
+                </a:solidFill>
+              </a14:hiddenFill>
+            </a:ext>
+          </a:extLst>
+        </p:spPr>
+      </p:pic>
+    </p:spTree>
+    <p:extLst>
+      <p:ext uri="{BB962C8B-B14F-4D97-AF65-F5344CB8AC3E}">
+        <p14:creationId xmlns:p14="http://schemas.microsoft.com/office/powerpoint/2010/main" val="3189438247"/>
+      </p:ext>
+    </p:extLst>
+  </p:cSld>
+  <p:clrMapOvr>
+    <a:masterClrMapping/>
+  </p:clrMapOvr>
 </p:sld>
 </file>
 

</xml_diff>